<commit_message>
Add some more animations
</commit_message>
<xml_diff>
--- a/Documents/Presentation.pptx
+++ b/Documents/Presentation.pptx
@@ -230,7 +230,7 @@
           <a:p>
             <a:fld id="{4E878FF3-63D9-4048-A5A9-A6BCBB84C4AE}" type="datetimeFigureOut">
               <a:rPr lang="bg-BG" smtClean="0"/>
-              <a:t>26.11.2020 г.</a:t>
+              <a:t>27.11.2020 г.</a:t>
             </a:fld>
             <a:endParaRPr lang="bg-BG"/>
           </a:p>
@@ -894,7 +894,7 @@
           <a:p>
             <a:fld id="{83284890-85D2-4D7B-8EF5-15A9C1DB8F42}" type="datetimeFigureOut">
               <a:rPr lang="en-US" smtClean="0"/>
-              <a:t>11/26/2020</a:t>
+              <a:t>11/27/2020</a:t>
             </a:fld>
             <a:endParaRPr lang="en-US"/>
           </a:p>
@@ -1106,7 +1106,7 @@
           <a:p>
             <a:fld id="{87157CC2-0FC8-4686-B024-99790E0F5162}" type="datetimeFigureOut">
               <a:rPr lang="en-US" smtClean="0"/>
-              <a:t>11/26/2020</a:t>
+              <a:t>11/27/2020</a:t>
             </a:fld>
             <a:endParaRPr lang="en-US"/>
           </a:p>
@@ -1367,7 +1367,7 @@
           <a:p>
             <a:fld id="{F6764DA5-CD3D-4590-A511-FCD3BC7A793E}" type="datetimeFigureOut">
               <a:rPr lang="en-US" smtClean="0"/>
-              <a:t>11/26/2020</a:t>
+              <a:t>11/27/2020</a:t>
             </a:fld>
             <a:endParaRPr lang="en-US"/>
           </a:p>
@@ -1540,7 +1540,7 @@
           <a:p>
             <a:fld id="{D30BB376-B19C-488D-ABEB-03C7E6E9E3E0}" type="datetimeFigureOut">
               <a:rPr lang="en-US" smtClean="0"/>
-              <a:t>11/26/2020</a:t>
+              <a:t>11/27/2020</a:t>
             </a:fld>
             <a:endParaRPr lang="en-US" dirty="0"/>
           </a:p>
@@ -1880,7 +1880,7 @@
           <a:p>
             <a:fld id="{C6F822A4-8DA6-4447-9B1F-C5DB58435268}" type="datetimeFigureOut">
               <a:rPr lang="en-US" smtClean="0"/>
-              <a:t>11/26/2020</a:t>
+              <a:t>11/27/2020</a:t>
             </a:fld>
             <a:endParaRPr lang="en-US"/>
           </a:p>
@@ -2195,7 +2195,7 @@
           <a:p>
             <a:fld id="{E548D31E-DCDA-41A7-9C67-C4B11B94D21D}" type="datetimeFigureOut">
               <a:rPr lang="en-US" smtClean="0"/>
-              <a:t>11/26/2020</a:t>
+              <a:t>11/27/2020</a:t>
             </a:fld>
             <a:endParaRPr lang="en-US"/>
           </a:p>
@@ -2577,7 +2577,7 @@
           <a:p>
             <a:fld id="{9B3762C0-B258-48F1-ADE6-176B4174CCDD}" type="datetimeFigureOut">
               <a:rPr lang="en-US" smtClean="0"/>
-              <a:t>11/26/2020</a:t>
+              <a:t>11/27/2020</a:t>
             </a:fld>
             <a:endParaRPr lang="en-US"/>
           </a:p>
@@ -2698,7 +2698,7 @@
           <a:p>
             <a:fld id="{677919A6-33EB-49BD-A62F-1FA56B9F9712}" type="datetimeFigureOut">
               <a:rPr lang="en-US" smtClean="0"/>
-              <a:t>11/26/2020</a:t>
+              <a:t>11/27/2020</a:t>
             </a:fld>
             <a:endParaRPr lang="en-US"/>
           </a:p>
@@ -2918,7 +2918,7 @@
           <a:p>
             <a:fld id="{4D94136C-8742-45B2-AF27-D93DF72833A9}" type="datetimeFigureOut">
               <a:rPr lang="en-US" smtClean="0"/>
-              <a:t>11/26/2020</a:t>
+              <a:t>11/27/2020</a:t>
             </a:fld>
             <a:endParaRPr lang="en-US"/>
           </a:p>
@@ -3278,7 +3278,7 @@
           <a:p>
             <a:fld id="{DA16AA21-1863-4931-97CB-99D0A168701B}" type="datetimeFigureOut">
               <a:rPr lang="en-US" smtClean="0"/>
-              <a:t>11/26/2020</a:t>
+              <a:t>11/27/2020</a:t>
             </a:fld>
             <a:endParaRPr lang="en-US"/>
           </a:p>
@@ -3660,7 +3660,7 @@
           <a:p>
             <a:fld id="{3772C379-9A7C-4C87-A116-CBE9F58B04C5}" type="datetimeFigureOut">
               <a:rPr lang="en-US" smtClean="0"/>
-              <a:t>11/26/2020</a:t>
+              <a:t>11/27/2020</a:t>
             </a:fld>
             <a:endParaRPr lang="en-US"/>
           </a:p>
@@ -3952,7 +3952,7 @@
           <a:p>
             <a:fld id="{5DC5B261-8843-42D1-AAFC-05E20E2D9B97}" type="datetimeFigureOut">
               <a:rPr lang="en-US" smtClean="0"/>
-              <a:t>11/26/2020</a:t>
+              <a:t>11/27/2020</a:t>
             </a:fld>
             <a:endParaRPr lang="en-US" dirty="0"/>
           </a:p>
@@ -5991,6 +5991,59 @@
                       </p:childTnLst>
                     </p:cTn>
                   </p:par>
+                  <p:par>
+                    <p:cTn id="7" fill="hold">
+                      <p:stCondLst>
+                        <p:cond delay="indefinite"/>
+                      </p:stCondLst>
+                      <p:childTnLst>
+                        <p:par>
+                          <p:cTn id="8" fill="hold">
+                            <p:stCondLst>
+                              <p:cond delay="0"/>
+                            </p:stCondLst>
+                            <p:childTnLst>
+                              <p:par>
+                                <p:cTn id="9" presetID="16" presetClass="entr" presetSubtype="21" fill="hold" nodeType="clickEffect">
+                                  <p:stCondLst>
+                                    <p:cond delay="0"/>
+                                  </p:stCondLst>
+                                  <p:childTnLst>
+                                    <p:set>
+                                      <p:cBhvr>
+                                        <p:cTn id="10" dur="1" fill="hold">
+                                          <p:stCondLst>
+                                            <p:cond delay="0"/>
+                                          </p:stCondLst>
+                                        </p:cTn>
+                                        <p:tgtEl>
+                                          <p:spTgt spid="6"/>
+                                        </p:tgtEl>
+                                        <p:attrNameLst>
+                                          <p:attrName>style.visibility</p:attrName>
+                                        </p:attrNameLst>
+                                      </p:cBhvr>
+                                      <p:to>
+                                        <p:strVal val="visible"/>
+                                      </p:to>
+                                    </p:set>
+                                    <p:animEffect transition="in" filter="barn(inVertical)">
+                                      <p:cBhvr>
+                                        <p:cTn id="11" dur="500"/>
+                                        <p:tgtEl>
+                                          <p:spTgt spid="6"/>
+                                        </p:tgtEl>
+                                      </p:cBhvr>
+                                    </p:animEffect>
+                                  </p:childTnLst>
+                                </p:cTn>
+                              </p:par>
+                            </p:childTnLst>
+                          </p:cTn>
+                        </p:par>
+                      </p:childTnLst>
+                    </p:cTn>
+                  </p:par>
                 </p:childTnLst>
               </p:cTn>
               <p:prevCondLst>
@@ -6010,7 +6063,7 @@
             </p:seq>
             <p:audio>
               <p:cMediaNode vol="80000">
-                <p:cTn id="7" fill="hold" display="0">
+                <p:cTn id="12" fill="hold" display="0">
                   <p:stCondLst>
                     <p:cond delay="indefinite"/>
                   </p:stCondLst>
@@ -6591,18 +6644,101 @@
   <p:clrMapOvr>
     <a:masterClrMapping/>
   </p:clrMapOvr>
-  <mc:AlternateContent xmlns:mc="http://schemas.openxmlformats.org/markup-compatibility/2006">
-    <mc:Choice xmlns:p14="http://schemas.microsoft.com/office/powerpoint/2010/main" Requires="p14">
+  <mc:AlternateContent xmlns:mc="http://schemas.openxmlformats.org/markup-compatibility/2006" xmlns:p14="http://schemas.microsoft.com/office/powerpoint/2010/main">
+    <mc:Choice Requires="p14">
       <p:transition spd="slow" p14:dur="1500">
         <p:split orient="vert"/>
       </p:transition>
     </mc:Choice>
-    <mc:Fallback>
+    <mc:Fallback xmlns="">
       <p:transition spd="slow">
         <p:split orient="vert"/>
       </p:transition>
     </mc:Fallback>
   </mc:AlternateContent>
+  <p:timing>
+    <p:tnLst>
+      <p:par>
+        <p:cTn id="1" dur="indefinite" restart="never" nodeType="tmRoot">
+          <p:childTnLst>
+            <p:seq concurrent="1" nextAc="seek">
+              <p:cTn id="2" dur="indefinite" nodeType="mainSeq">
+                <p:childTnLst>
+                  <p:par>
+                    <p:cTn id="3" fill="hold">
+                      <p:stCondLst>
+                        <p:cond delay="indefinite"/>
+                      </p:stCondLst>
+                      <p:childTnLst>
+                        <p:par>
+                          <p:cTn id="4" fill="hold">
+                            <p:stCondLst>
+                              <p:cond delay="0"/>
+                            </p:stCondLst>
+                            <p:childTnLst>
+                              <p:par>
+                                <p:cTn id="5" presetID="6" presetClass="entr" presetSubtype="16" fill="hold" nodeType="clickEffect">
+                                  <p:stCondLst>
+                                    <p:cond delay="0"/>
+                                  </p:stCondLst>
+                                  <p:childTnLst>
+                                    <p:set>
+                                      <p:cBhvr>
+                                        <p:cTn id="6" dur="1" fill="hold">
+                                          <p:stCondLst>
+                                            <p:cond delay="0"/>
+                                          </p:stCondLst>
+                                        </p:cTn>
+                                        <p:tgtEl>
+                                          <p:spTgt spid="10"/>
+                                        </p:tgtEl>
+                                        <p:attrNameLst>
+                                          <p:attrName>style.visibility</p:attrName>
+                                        </p:attrNameLst>
+                                      </p:cBhvr>
+                                      <p:to>
+                                        <p:strVal val="visible"/>
+                                      </p:to>
+                                    </p:set>
+                                    <p:animEffect transition="in" filter="circle(in)">
+                                      <p:cBhvr>
+                                        <p:cTn id="7" dur="2000"/>
+                                        <p:tgtEl>
+                                          <p:spTgt spid="10"/>
+                                        </p:tgtEl>
+                                      </p:cBhvr>
+                                    </p:animEffect>
+                                  </p:childTnLst>
+                                </p:cTn>
+                              </p:par>
+                            </p:childTnLst>
+                          </p:cTn>
+                        </p:par>
+                      </p:childTnLst>
+                    </p:cTn>
+                  </p:par>
+                </p:childTnLst>
+              </p:cTn>
+              <p:prevCondLst>
+                <p:cond evt="onPrev" delay="0">
+                  <p:tgtEl>
+                    <p:sldTgt/>
+                  </p:tgtEl>
+                </p:cond>
+              </p:prevCondLst>
+              <p:nextCondLst>
+                <p:cond evt="onNext" delay="0">
+                  <p:tgtEl>
+                    <p:sldTgt/>
+                  </p:tgtEl>
+                </p:cond>
+              </p:nextCondLst>
+            </p:seq>
+          </p:childTnLst>
+        </p:cTn>
+      </p:par>
+    </p:tnLst>
+  </p:timing>
 </p:sld>
 </file>
 
@@ -8609,18 +8745,195 @@
   <p:clrMapOvr>
     <a:masterClrMapping/>
   </p:clrMapOvr>
-  <mc:AlternateContent xmlns:mc="http://schemas.openxmlformats.org/markup-compatibility/2006">
-    <mc:Choice xmlns:p14="http://schemas.microsoft.com/office/powerpoint/2010/main" Requires="p14">
+  <mc:AlternateContent xmlns:mc="http://schemas.openxmlformats.org/markup-compatibility/2006" xmlns:p14="http://schemas.microsoft.com/office/powerpoint/2010/main">
+    <mc:Choice Requires="p14">
       <p:transition spd="slow">
         <p14:flash/>
       </p:transition>
     </mc:Choice>
-    <mc:Fallback>
+    <mc:Fallback xmlns="">
       <p:transition spd="slow">
         <p:fade/>
       </p:transition>
     </mc:Fallback>
   </mc:AlternateContent>
+  <p:timing>
+    <p:tnLst>
+      <p:par>
+        <p:cTn id="1" dur="indefinite" restart="never" nodeType="tmRoot">
+          <p:childTnLst>
+            <p:seq concurrent="1" nextAc="seek">
+              <p:cTn id="2" dur="indefinite" nodeType="mainSeq">
+                <p:childTnLst>
+                  <p:par>
+                    <p:cTn id="3" fill="hold">
+                      <p:stCondLst>
+                        <p:cond delay="indefinite"/>
+                      </p:stCondLst>
+                      <p:childTnLst>
+                        <p:par>
+                          <p:cTn id="4" fill="hold">
+                            <p:stCondLst>
+                              <p:cond delay="0"/>
+                            </p:stCondLst>
+                            <p:childTnLst>
+                              <p:par>
+                                <p:cTn id="5" presetID="2" presetClass="entr" presetSubtype="4" fill="hold" nodeType="clickEffect">
+                                  <p:stCondLst>
+                                    <p:cond delay="0"/>
+                                  </p:stCondLst>
+                                  <p:childTnLst>
+                                    <p:set>
+                                      <p:cBhvr>
+                                        <p:cTn id="6" dur="1" fill="hold">
+                                          <p:stCondLst>
+                                            <p:cond delay="0"/>
+                                          </p:stCondLst>
+                                        </p:cTn>
+                                        <p:tgtEl>
+                                          <p:spTgt spid="6"/>
+                                        </p:tgtEl>
+                                        <p:attrNameLst>
+                                          <p:attrName>style.visibility</p:attrName>
+                                        </p:attrNameLst>
+                                      </p:cBhvr>
+                                      <p:to>
+                                        <p:strVal val="visible"/>
+                                      </p:to>
+                                    </p:set>
+                                    <p:anim calcmode="lin" valueType="num">
+                                      <p:cBhvr additive="base">
+                                        <p:cTn id="7" dur="500" fill="hold"/>
+                                        <p:tgtEl>
+                                          <p:spTgt spid="6"/>
+                                        </p:tgtEl>
+                                        <p:attrNameLst>
+                                          <p:attrName>ppt_x</p:attrName>
+                                        </p:attrNameLst>
+                                      </p:cBhvr>
+                                      <p:tavLst>
+                                        <p:tav tm="0">
+                                          <p:val>
+                                            <p:strVal val="#ppt_x"/>
+                                          </p:val>
+                                        </p:tav>
+                                        <p:tav tm="100000">
+                                          <p:val>
+                                            <p:strVal val="#ppt_x"/>
+                                          </p:val>
+                                        </p:tav>
+                                      </p:tavLst>
+                                    </p:anim>
+                                    <p:anim calcmode="lin" valueType="num">
+                                      <p:cBhvr additive="base">
+                                        <p:cTn id="8" dur="500" fill="hold"/>
+                                        <p:tgtEl>
+                                          <p:spTgt spid="6"/>
+                                        </p:tgtEl>
+                                        <p:attrNameLst>
+                                          <p:attrName>ppt_y</p:attrName>
+                                        </p:attrNameLst>
+                                      </p:cBhvr>
+                                      <p:tavLst>
+                                        <p:tav tm="0">
+                                          <p:val>
+                                            <p:strVal val="1+#ppt_h/2"/>
+                                          </p:val>
+                                        </p:tav>
+                                        <p:tav tm="100000">
+                                          <p:val>
+                                            <p:strVal val="#ppt_y"/>
+                                          </p:val>
+                                        </p:tav>
+                                      </p:tavLst>
+                                    </p:anim>
+                                  </p:childTnLst>
+                                </p:cTn>
+                              </p:par>
+                            </p:childTnLst>
+                          </p:cTn>
+                        </p:par>
+                      </p:childTnLst>
+                    </p:cTn>
+                  </p:par>
+                  <p:par>
+                    <p:cTn id="9" fill="hold">
+                      <p:stCondLst>
+                        <p:cond delay="indefinite"/>
+                      </p:stCondLst>
+                      <p:childTnLst>
+                        <p:par>
+                          <p:cTn id="10" fill="hold">
+                            <p:stCondLst>
+                              <p:cond delay="0"/>
+                            </p:stCondLst>
+                            <p:childTnLst>
+                              <p:par>
+                                <p:cTn id="11" presetID="16" presetClass="entr" presetSubtype="21" fill="hold" grpId="0" nodeType="clickEffect">
+                                  <p:stCondLst>
+                                    <p:cond delay="0"/>
+                                  </p:stCondLst>
+                                  <p:childTnLst>
+                                    <p:set>
+                                      <p:cBhvr>
+                                        <p:cTn id="12" dur="1" fill="hold">
+                                          <p:stCondLst>
+                                            <p:cond delay="0"/>
+                                          </p:stCondLst>
+                                        </p:cTn>
+                                        <p:tgtEl>
+                                          <p:spTgt spid="2"/>
+                                        </p:tgtEl>
+                                        <p:attrNameLst>
+                                          <p:attrName>style.visibility</p:attrName>
+                                        </p:attrNameLst>
+                                      </p:cBhvr>
+                                      <p:to>
+                                        <p:strVal val="visible"/>
+                                      </p:to>
+                                    </p:set>
+                                    <p:animEffect transition="in" filter="barn(inVertical)">
+                                      <p:cBhvr>
+                                        <p:cTn id="13" dur="500"/>
+                                        <p:tgtEl>
+                                          <p:spTgt spid="2"/>
+                                        </p:tgtEl>
+                                      </p:cBhvr>
+                                    </p:animEffect>
+                                  </p:childTnLst>
+                                </p:cTn>
+                              </p:par>
+                            </p:childTnLst>
+                          </p:cTn>
+                        </p:par>
+                      </p:childTnLst>
+                    </p:cTn>
+                  </p:par>
+                </p:childTnLst>
+              </p:cTn>
+              <p:prevCondLst>
+                <p:cond evt="onPrev" delay="0">
+                  <p:tgtEl>
+                    <p:sldTgt/>
+                  </p:tgtEl>
+                </p:cond>
+              </p:prevCondLst>
+              <p:nextCondLst>
+                <p:cond evt="onNext" delay="0">
+                  <p:tgtEl>
+                    <p:sldTgt/>
+                  </p:tgtEl>
+                </p:cond>
+              </p:nextCondLst>
+            </p:seq>
+          </p:childTnLst>
+        </p:cTn>
+      </p:par>
+    </p:tnLst>
+    <p:bldLst>
+      <p:bldP spid="2" grpId="0"/>
+    </p:bldLst>
+  </p:timing>
 </p:sld>
 </file>
 
@@ -9169,21 +9482,6 @@
 </file>
 
 <file path=customXml/item1.xml><?xml version="1.0" encoding="utf-8"?>
-<p:properties xmlns:p="http://schemas.microsoft.com/office/2006/metadata/properties" xmlns:xsi="http://www.w3.org/2001/XMLSchema-instance" xmlns:pc="http://schemas.microsoft.com/office/infopath/2007/PartnerControls">
-  <documentManagement/>
-</p:properties>
-</file>
-
-<file path=customXml/item2.xml><?xml version="1.0" encoding="utf-8"?>
-<?mso-contentType ?>
-<FormTemplates xmlns="http://schemas.microsoft.com/sharepoint/v3/contenttype/forms">
-  <Display>DocumentLibraryForm</Display>
-  <Edit>DocumentLibraryForm</Edit>
-  <New>DocumentLibraryForm</New>
-</FormTemplates>
-</file>
-
-<file path=customXml/item3.xml><?xml version="1.0" encoding="utf-8"?>
 <ct:contentTypeSchema xmlns:ct="http://schemas.microsoft.com/office/2006/metadata/contentType" xmlns:ma="http://schemas.microsoft.com/office/2006/metadata/properties/metaAttributes" ct:_="" ma:_="" ma:contentTypeName="Document" ma:contentTypeID="0x0101003793F33423CAB540876E07D1711AC023" ma:contentTypeVersion="5" ma:contentTypeDescription="Create a new document." ma:contentTypeScope="" ma:versionID="abfe9e28213b4758d1c20d852584f265">
   <xsd:schema xmlns:xsd="http://www.w3.org/2001/XMLSchema" xmlns:xs="http://www.w3.org/2001/XMLSchema" xmlns:p="http://schemas.microsoft.com/office/2006/metadata/properties" xmlns:ns2="44b5bade-0608-4775-89b1-ce8643f31210" targetNamespace="http://schemas.microsoft.com/office/2006/metadata/properties" ma:root="true" ma:fieldsID="5481ee06df4cb0237fe73c831910cb77" ns2:_="">
     <xsd:import namespace="44b5bade-0608-4775-89b1-ce8643f31210"/>
@@ -9333,31 +9631,22 @@
 </ct:contentTypeSchema>
 </file>
 
-<file path=customXml/itemProps1.xml><?xml version="1.0" encoding="utf-8"?>
-<ds:datastoreItem xmlns:ds="http://schemas.openxmlformats.org/officeDocument/2006/customXml" ds:itemID="{A84C556A-A7EE-4541-94B5-0EC8AD757A70}">
-  <ds:schemaRefs>
-    <ds:schemaRef ds:uri="http://schemas.microsoft.com/office/2006/metadata/properties"/>
-    <ds:schemaRef ds:uri="44b5bade-0608-4775-89b1-ce8643f31210"/>
-    <ds:schemaRef ds:uri="http://schemas.microsoft.com/office/2006/documentManagement/types"/>
-    <ds:schemaRef ds:uri="http://purl.org/dc/dcmitype/"/>
-    <ds:schemaRef ds:uri="http://purl.org/dc/terms/"/>
-    <ds:schemaRef ds:uri="http://purl.org/dc/elements/1.1/"/>
-    <ds:schemaRef ds:uri="http://schemas.microsoft.com/office/infopath/2007/PartnerControls"/>
-    <ds:schemaRef ds:uri="http://schemas.openxmlformats.org/package/2006/metadata/core-properties"/>
-    <ds:schemaRef ds:uri="http://www.w3.org/XML/1998/namespace"/>
-  </ds:schemaRefs>
-</ds:datastoreItem>
+<file path=customXml/item2.xml><?xml version="1.0" encoding="utf-8"?>
+<?mso-contentType ?>
+<FormTemplates xmlns="http://schemas.microsoft.com/sharepoint/v3/contenttype/forms">
+  <Display>DocumentLibraryForm</Display>
+  <Edit>DocumentLibraryForm</Edit>
+  <New>DocumentLibraryForm</New>
+</FormTemplates>
 </file>
 
-<file path=customXml/itemProps2.xml><?xml version="1.0" encoding="utf-8"?>
-<ds:datastoreItem xmlns:ds="http://schemas.openxmlformats.org/officeDocument/2006/customXml" ds:itemID="{86E9E3A7-1066-403D-8B34-EA133FEAB752}">
-  <ds:schemaRefs>
-    <ds:schemaRef ds:uri="http://schemas.microsoft.com/sharepoint/v3/contenttype/forms"/>
-  </ds:schemaRefs>
-</ds:datastoreItem>
+<file path=customXml/item3.xml><?xml version="1.0" encoding="utf-8"?>
+<p:properties xmlns:p="http://schemas.microsoft.com/office/2006/metadata/properties" xmlns:xsi="http://www.w3.org/2001/XMLSchema-instance" xmlns:pc="http://schemas.microsoft.com/office/infopath/2007/PartnerControls">
+  <documentManagement/>
+</p:properties>
 </file>
 
-<file path=customXml/itemProps3.xml><?xml version="1.0" encoding="utf-8"?>
+<file path=customXml/itemProps1.xml><?xml version="1.0" encoding="utf-8"?>
 <ds:datastoreItem xmlns:ds="http://schemas.openxmlformats.org/officeDocument/2006/customXml" ds:itemID="{1E00ECE0-40F6-4C84-A4B1-BD707658F4D0}">
   <ds:schemaRefs>
     <ds:schemaRef ds:uri="44b5bade-0608-4775-89b1-ce8643f31210"/>
@@ -9373,4 +9662,28 @@
     <ds:schemaRef ds:uri="http://www.w3.org/2001/XMLSchema"/>
   </ds:schemaRefs>
 </ds:datastoreItem>
+</file>
+
+<file path=customXml/itemProps2.xml><?xml version="1.0" encoding="utf-8"?>
+<ds:datastoreItem xmlns:ds="http://schemas.openxmlformats.org/officeDocument/2006/customXml" ds:itemID="{86E9E3A7-1066-403D-8B34-EA133FEAB752}">
+  <ds:schemaRefs>
+    <ds:schemaRef ds:uri="http://schemas.microsoft.com/sharepoint/v3/contenttype/forms"/>
+  </ds:schemaRefs>
+</ds:datastoreItem>
+</file>
+
+<file path=customXml/itemProps3.xml><?xml version="1.0" encoding="utf-8"?>
+<ds:datastoreItem xmlns:ds="http://schemas.openxmlformats.org/officeDocument/2006/customXml" ds:itemID="{A84C556A-A7EE-4541-94B5-0EC8AD757A70}">
+  <ds:schemaRefs>
+    <ds:schemaRef ds:uri="http://schemas.microsoft.com/office/2006/metadata/properties"/>
+    <ds:schemaRef ds:uri="44b5bade-0608-4775-89b1-ce8643f31210"/>
+    <ds:schemaRef ds:uri="http://schemas.microsoft.com/office/2006/documentManagement/types"/>
+    <ds:schemaRef ds:uri="http://purl.org/dc/dcmitype/"/>
+    <ds:schemaRef ds:uri="http://purl.org/dc/terms/"/>
+    <ds:schemaRef ds:uri="http://purl.org/dc/elements/1.1/"/>
+    <ds:schemaRef ds:uri="http://schemas.microsoft.com/office/infopath/2007/PartnerControls"/>
+    <ds:schemaRef ds:uri="http://schemas.openxmlformats.org/package/2006/metadata/core-properties"/>
+    <ds:schemaRef ds:uri="http://www.w3.org/XML/1998/namespace"/>
+  </ds:schemaRefs>
+</ds:datastoreItem>
 </file>
</xml_diff>